<commit_message>
make network weighted => edges={int(node):{int(node): int(weight)}}
</commit_message>
<xml_diff>
--- a/presentation/midterm/midterm_slides.pptx
+++ b/presentation/midterm/midterm_slides.pptx
@@ -240,7 +240,7 @@
           <a:p>
             <a:fld id="{36606CF4-FA77-4E71-BDBB-B62F97D48318}" type="datetimeFigureOut">
               <a:rPr lang="zh-CN" altLang="en-US" smtClean="0"/>
-              <a:t>2021/4/21</a:t>
+              <a:t>2021/4/27</a:t>
             </a:fld>
             <a:endParaRPr lang="zh-CN" altLang="en-US"/>
           </a:p>
@@ -1063,7 +1063,7 @@
             <a:fld id="{6489D9C7-5DC6-4263-87FF-7C99F6FB63C3}" type="datetime1">
               <a:rPr lang="zh-CN" altLang="en-US" smtClean="0"/>
               <a:pPr/>
-              <a:t>2021/4/21</a:t>
+              <a:t>2021/4/27</a:t>
             </a:fld>
             <a:endParaRPr lang="zh-CN" altLang="en-US"/>
           </a:p>
@@ -1257,7 +1257,7 @@
             <a:fld id="{6489D9C7-5DC6-4263-87FF-7C99F6FB63C3}" type="datetime1">
               <a:rPr lang="zh-CN" altLang="en-US" smtClean="0"/>
               <a:pPr/>
-              <a:t>2021/4/21</a:t>
+              <a:t>2021/4/27</a:t>
             </a:fld>
             <a:endParaRPr lang="zh-CN" altLang="en-US"/>
           </a:p>
@@ -1404,7 +1404,7 @@
             <a:fld id="{6489D9C7-5DC6-4263-87FF-7C99F6FB63C3}" type="datetime1">
               <a:rPr lang="zh-CN" altLang="en-US" smtClean="0"/>
               <a:pPr/>
-              <a:t>2021/4/21</a:t>
+              <a:t>2021/4/27</a:t>
             </a:fld>
             <a:endParaRPr lang="zh-CN" altLang="en-US"/>
           </a:p>
@@ -1872,7 +1872,7 @@
             <a:fld id="{6489D9C7-5DC6-4263-87FF-7C99F6FB63C3}" type="datetime1">
               <a:rPr lang="zh-CN" altLang="en-US" smtClean="0"/>
               <a:pPr/>
-              <a:t>2021/4/21</a:t>
+              <a:t>2021/4/27</a:t>
             </a:fld>
             <a:endParaRPr lang="zh-CN" altLang="en-US"/>
           </a:p>
@@ -11371,7 +11371,18 @@
                     </a:schemeClr>
                   </a:solidFill>
                 </a:rPr>
-                <a:t>Vast number of discrete time point</a:t>
+                <a:t>Vast number of discrete time point </a:t>
+              </a:r>
+              <a:r>
+                <a:rPr lang="en-US" sz="1100" dirty="0">
+                  <a:solidFill>
+                    <a:schemeClr val="tx1">
+                      <a:lumMod val="50000"/>
+                      <a:lumOff val="50000"/>
+                    </a:schemeClr>
+                  </a:solidFill>
+                </a:rPr>
+                <a:t>(3100)</a:t>
               </a:r>
             </a:p>
             <a:p>

</xml_diff>